<commit_message>
All input parameters done
</commit_message>
<xml_diff>
--- a/img/Logo.pptx
+++ b/img/Logo.pptx
@@ -3553,7 +3553,7 @@
               <a:avLst/>
             </a:prstGeom>
             <a:solidFill>
-              <a:srgbClr val="1D85AD"/>
+              <a:srgbClr val="0D3E51"/>
             </a:solidFill>
             <a:ln w="28575">
               <a:noFill/>
@@ -3626,12 +3626,10 @@
               <a:avLst/>
             </a:prstGeom>
             <a:solidFill>
-              <a:srgbClr val="1D85AD"/>
+              <a:srgbClr val="0D3E51"/>
             </a:solidFill>
             <a:ln w="28575">
-              <a:solidFill>
-                <a:schemeClr val="bg1"/>
-              </a:solidFill>
+              <a:noFill/>
             </a:ln>
           </p:spPr>
           <p:style>
@@ -3692,9 +3690,7 @@
               <a:avLst/>
             </a:prstGeom>
             <a:ln>
-              <a:solidFill>
-                <a:schemeClr val="bg1"/>
-              </a:solidFill>
+              <a:noFill/>
             </a:ln>
           </p:spPr>
         </p:pic>
@@ -3729,9 +3725,7 @@
               <a:avLst/>
             </a:prstGeom>
             <a:ln>
-              <a:solidFill>
-                <a:schemeClr val="bg1"/>
-              </a:solidFill>
+              <a:noFill/>
             </a:ln>
           </p:spPr>
         </p:pic>
@@ -3768,9 +3762,7 @@
               <a:avLst/>
             </a:prstGeom>
             <a:ln>
-              <a:solidFill>
-                <a:schemeClr val="bg1"/>
-              </a:solidFill>
+              <a:noFill/>
             </a:ln>
           </p:spPr>
         </p:pic>
@@ -4317,19 +4309,17 @@
         </p:nvSpPr>
         <p:spPr>
           <a:xfrm>
-            <a:off x="260552" y="291461"/>
+            <a:off x="260552" y="255602"/>
             <a:ext cx="4316360" cy="954107"/>
           </a:xfrm>
           <a:prstGeom prst="rect">
             <a:avLst/>
           </a:prstGeom>
           <a:solidFill>
-            <a:srgbClr val="1D85AD"/>
+            <a:srgbClr val="0D3E51"/>
           </a:solidFill>
           <a:ln w="12700">
-            <a:solidFill>
-              <a:schemeClr val="bg1"/>
-            </a:solidFill>
+            <a:noFill/>
           </a:ln>
         </p:spPr>
         <p:txBody>
@@ -4552,7 +4542,7 @@
             <a:avLst/>
           </a:prstGeom>
           <a:solidFill>
-            <a:srgbClr val="1D85AD"/>
+            <a:srgbClr val="0D3E51"/>
           </a:solidFill>
           <a:ln w="12700">
             <a:solidFill>

</xml_diff>

<commit_message>
Made the new dashboard the default
</commit_message>
<xml_diff>
--- a/img/Logo.pptx
+++ b/img/Logo.pptx
@@ -3626,10 +3626,12 @@
               <a:avLst/>
             </a:prstGeom>
             <a:solidFill>
-              <a:srgbClr val="0D3E51"/>
+              <a:srgbClr val="1D85AD"/>
             </a:solidFill>
             <a:ln w="28575">
-              <a:noFill/>
+              <a:solidFill>
+                <a:schemeClr val="bg1"/>
+              </a:solidFill>
             </a:ln>
           </p:spPr>
           <p:style>
@@ -3690,7 +3692,9 @@
               <a:avLst/>
             </a:prstGeom>
             <a:ln>
-              <a:noFill/>
+              <a:solidFill>
+                <a:schemeClr val="bg1"/>
+              </a:solidFill>
             </a:ln>
           </p:spPr>
         </p:pic>
@@ -3725,7 +3729,9 @@
               <a:avLst/>
             </a:prstGeom>
             <a:ln>
-              <a:noFill/>
+              <a:solidFill>
+                <a:schemeClr val="bg1"/>
+              </a:solidFill>
             </a:ln>
           </p:spPr>
         </p:pic>
@@ -3762,7 +3768,9 @@
               <a:avLst/>
             </a:prstGeom>
             <a:ln>
-              <a:noFill/>
+              <a:solidFill>
+                <a:schemeClr val="bg1"/>
+              </a:solidFill>
             </a:ln>
           </p:spPr>
         </p:pic>
@@ -3998,7 +4006,7 @@
               <a:avLst/>
             </a:prstGeom>
             <a:solidFill>
-              <a:srgbClr val="1D85AD"/>
+              <a:srgbClr val="0D3E51"/>
             </a:solidFill>
             <a:ln w="28575">
               <a:noFill/>
@@ -4265,70 +4273,6 @@
           </p:txBody>
         </p:sp>
       </p:grpSp>
-      <p:sp>
-        <p:nvSpPr>
-          <p:cNvPr id="31" name="Oval 30">
-            <a:extLst>
-              <a:ext uri="{FF2B5EF4-FFF2-40B4-BE49-F238E27FC236}">
-                <a16:creationId xmlns:a16="http://schemas.microsoft.com/office/drawing/2014/main" id="{C98D4260-3CDB-41E8-B4DB-E417DFF02376}"/>
-              </a:ext>
-            </a:extLst>
-          </p:cNvPr>
-          <p:cNvSpPr/>
-          <p:nvPr/>
-        </p:nvSpPr>
-        <p:spPr>
-          <a:xfrm>
-            <a:off x="706279" y="2908027"/>
-            <a:ext cx="323273" cy="314037"/>
-          </a:xfrm>
-          <a:prstGeom prst="ellipse">
-            <a:avLst/>
-          </a:prstGeom>
-          <a:solidFill>
-            <a:srgbClr val="FFFF00"/>
-          </a:solidFill>
-          <a:ln>
-            <a:noFill/>
-          </a:ln>
-          <a:effectLst>
-            <a:glow rad="63500">
-              <a:schemeClr val="accent4">
-                <a:lumMod val="60000"/>
-                <a:lumOff val="40000"/>
-                <a:alpha val="80000"/>
-              </a:schemeClr>
-            </a:glow>
-            <a:outerShdw blurRad="50800" dist="50800" dir="5400000" algn="ctr" rotWithShape="0">
-              <a:srgbClr val="FFFF00"/>
-            </a:outerShdw>
-          </a:effectLst>
-        </p:spPr>
-        <p:style>
-          <a:lnRef idx="2">
-            <a:schemeClr val="accent1">
-              <a:shade val="50000"/>
-            </a:schemeClr>
-          </a:lnRef>
-          <a:fillRef idx="1">
-            <a:schemeClr val="accent1"/>
-          </a:fillRef>
-          <a:effectRef idx="0">
-            <a:schemeClr val="accent1"/>
-          </a:effectRef>
-          <a:fontRef idx="minor">
-            <a:schemeClr val="lt1"/>
-          </a:fontRef>
-        </p:style>
-        <p:txBody>
-          <a:bodyPr rtlCol="0" anchor="ctr"/>
-          <a:lstStyle/>
-          <a:p>
-            <a:pPr algn="ctr"/>
-            <a:endParaRPr lang="en-IN"/>
-          </a:p>
-        </p:txBody>
-      </p:sp>
     </p:spTree>
     <p:extLst>
       <p:ext uri="{BB962C8B-B14F-4D97-AF65-F5344CB8AC3E}">
@@ -4373,17 +4317,19 @@
         </p:nvSpPr>
         <p:spPr>
           <a:xfrm>
-            <a:off x="260552" y="255602"/>
+            <a:off x="260552" y="291461"/>
             <a:ext cx="4316360" cy="954107"/>
           </a:xfrm>
           <a:prstGeom prst="rect">
             <a:avLst/>
           </a:prstGeom>
           <a:solidFill>
-            <a:srgbClr val="0D3E51"/>
+            <a:srgbClr val="1D85AD"/>
           </a:solidFill>
           <a:ln w="12700">
-            <a:noFill/>
+            <a:solidFill>
+              <a:schemeClr val="bg1"/>
+            </a:solidFill>
           </a:ln>
         </p:spPr>
         <p:txBody>
@@ -4606,10 +4552,12 @@
             <a:avLst/>
           </a:prstGeom>
           <a:solidFill>
-            <a:srgbClr val="0D3E51"/>
+            <a:srgbClr val="1D85AD"/>
           </a:solidFill>
           <a:ln w="12700">
-            <a:noFill/>
+            <a:solidFill>
+              <a:schemeClr val="bg1"/>
+            </a:solidFill>
           </a:ln>
         </p:spPr>
         <p:txBody>

</xml_diff>